<commit_message>
added a bit about optimal noise search at end
</commit_message>
<xml_diff>
--- a/pres/ppw12-pres.pptx
+++ b/pres/ppw12-pres.pptx
@@ -5,10 +5,10 @@
     <p:sldMasterId id="2147483817" r:id="rId1"/>
   </p:sldMasterIdLst>
   <p:notesMasterIdLst>
-    <p:notesMasterId r:id="rId18"/>
+    <p:notesMasterId r:id="rId19"/>
   </p:notesMasterIdLst>
   <p:handoutMasterIdLst>
-    <p:handoutMasterId r:id="rId19"/>
+    <p:handoutMasterId r:id="rId20"/>
   </p:handoutMasterIdLst>
   <p:sldIdLst>
     <p:sldId id="409" r:id="rId2"/>
@@ -26,12 +26,13 @@
     <p:sldId id="479" r:id="rId14"/>
     <p:sldId id="480" r:id="rId15"/>
     <p:sldId id="481" r:id="rId16"/>
-    <p:sldId id="483" r:id="rId17"/>
+    <p:sldId id="484" r:id="rId17"/>
+    <p:sldId id="483" r:id="rId18"/>
   </p:sldIdLst>
   <p:sldSz cx="9144000" cy="6858000" type="screen4x3"/>
   <p:notesSz cx="6858000" cy="9144000"/>
   <p:custDataLst>
-    <p:tags r:id="rId21"/>
+    <p:tags r:id="rId22"/>
   </p:custDataLst>
   <p:defaultTextStyle>
     <a:defPPr>
@@ -148,6 +149,7 @@
             <p14:sldId id="479"/>
             <p14:sldId id="480"/>
             <p14:sldId id="481"/>
+            <p14:sldId id="484"/>
             <p14:sldId id="483"/>
           </p14:sldIdLst>
         </p14:section>
@@ -1076,6 +1078,90 @@
             <a:fld id="{0DC66269-55CE-0345-90F5-F0D326DEF3FA}" type="slidenum">
               <a:rPr lang="en-US" smtClean="0"/>
               <a:t>15</a:t>
+            </a:fld>
+            <a:endParaRPr lang="en-US"/>
+          </a:p>
+        </p:txBody>
+      </p:sp>
+    </p:spTree>
+    <p:extLst>
+      <p:ext uri="{BB962C8B-B14F-4D97-AF65-F5344CB8AC3E}">
+        <p14:creationId xmlns:p14="http://schemas.microsoft.com/office/powerpoint/2010/main" val="117532529"/>
+      </p:ext>
+    </p:extLst>
+  </p:cSld>
+  <p:clrMapOvr>
+    <a:masterClrMapping/>
+  </p:clrMapOvr>
+</p:notes>
+</file>
+
+<file path=ppt/notesSlides/notesSlide6.xml><?xml version="1.0" encoding="utf-8"?>
+<p:notes xmlns:a="http://schemas.openxmlformats.org/drawingml/2006/main" xmlns:r="http://schemas.openxmlformats.org/officeDocument/2006/relationships" xmlns:p="http://schemas.openxmlformats.org/presentationml/2006/main">
+  <p:cSld>
+    <p:spTree>
+      <p:nvGrpSpPr>
+        <p:cNvPr id="1" name=""/>
+        <p:cNvGrpSpPr/>
+        <p:nvPr/>
+      </p:nvGrpSpPr>
+      <p:grpSpPr>
+        <a:xfrm>
+          <a:off x="0" y="0"/>
+          <a:ext cx="0" cy="0"/>
+          <a:chOff x="0" y="0"/>
+          <a:chExt cx="0" cy="0"/>
+        </a:xfrm>
+      </p:grpSpPr>
+      <p:sp>
+        <p:nvSpPr>
+          <p:cNvPr id="2" name="Slide Image Placeholder 1"/>
+          <p:cNvSpPr>
+            <a:spLocks noGrp="1" noRot="1" noChangeAspect="1"/>
+          </p:cNvSpPr>
+          <p:nvPr>
+            <p:ph type="sldImg"/>
+          </p:nvPr>
+        </p:nvSpPr>
+        <p:spPr/>
+      </p:sp>
+      <p:sp>
+        <p:nvSpPr>
+          <p:cNvPr id="3" name="Notes Placeholder 2"/>
+          <p:cNvSpPr>
+            <a:spLocks noGrp="1"/>
+          </p:cNvSpPr>
+          <p:nvPr>
+            <p:ph type="body" idx="1"/>
+          </p:nvPr>
+        </p:nvSpPr>
+        <p:spPr/>
+        <p:txBody>
+          <a:bodyPr/>
+          <a:lstStyle/>
+          <a:p>
+            <a:endParaRPr lang="en-US" dirty="0"/>
+          </a:p>
+        </p:txBody>
+      </p:sp>
+      <p:sp>
+        <p:nvSpPr>
+          <p:cNvPr id="4" name="Slide Number Placeholder 3"/>
+          <p:cNvSpPr>
+            <a:spLocks noGrp="1"/>
+          </p:cNvSpPr>
+          <p:nvPr>
+            <p:ph type="sldNum" sz="quarter" idx="10"/>
+          </p:nvPr>
+        </p:nvSpPr>
+        <p:spPr/>
+        <p:txBody>
+          <a:bodyPr/>
+          <a:lstStyle/>
+          <a:p>
+            <a:fld id="{0DC66269-55CE-0345-90F5-F0D326DEF3FA}" type="slidenum">
+              <a:rPr lang="en-US" smtClean="0"/>
+              <a:t>16</a:t>
             </a:fld>
             <a:endParaRPr lang="en-US"/>
           </a:p>
@@ -11889,7 +11975,7 @@
             </a:pPr>
             <a:r>
               <a:rPr lang="en-US" dirty="0" smtClean="0"/>
-              <a:t>Sound check for min-entropy thresholds.</a:t>
+              <a:t>Policy: sound check for min-entropy bounds</a:t>
             </a:r>
             <a:endParaRPr lang="en-US" dirty="0"/>
           </a:p>
@@ -12200,7 +12286,7 @@
         </p:nvSpPr>
         <p:spPr>
           <a:xfrm>
-            <a:off x="228600" y="1905000"/>
+            <a:off x="228600" y="1676400"/>
             <a:ext cx="8686800" cy="923330"/>
           </a:xfrm>
           <a:prstGeom prst="rect">
@@ -12219,8 +12305,12 @@
               <a:buChar char="•"/>
             </a:pPr>
             <a:r>
+              <a:rPr lang="en-US" b="1" dirty="0" smtClean="0"/>
+              <a:t>Convenient</a:t>
+            </a:r>
+            <a:r>
               <a:rPr lang="en-US" dirty="0" smtClean="0"/>
-              <a:t>Convenient reasoning about information security.</a:t>
+              <a:t> reasoning about information security.</a:t>
             </a:r>
           </a:p>
           <a:p>
@@ -12229,8 +12319,16 @@
               <a:buChar char="•"/>
             </a:pPr>
             <a:r>
-              <a:rPr lang="en-US" dirty="0" smtClean="0"/>
-              <a:t>“Semantic” information flow: more flexible than quantified information flow</a:t>
+              <a:rPr lang="en-US" sz="1600" dirty="0" smtClean="0"/>
+              <a:t>“Semantic” information flow: more </a:t>
+            </a:r>
+            <a:r>
+              <a:rPr lang="en-US" sz="1600" b="1" dirty="0" smtClean="0"/>
+              <a:t>flexible</a:t>
+            </a:r>
+            <a:r>
+              <a:rPr lang="en-US" sz="1600" dirty="0" smtClean="0"/>
+              <a:t> than quantified information flow</a:t>
             </a:r>
           </a:p>
           <a:p>
@@ -12240,23 +12338,31 @@
             </a:pPr>
             <a:r>
               <a:rPr lang="en-US" dirty="0" smtClean="0"/>
-              <a:t>Enforcement mechanisms require soundness to guarantee security conditions.</a:t>
+              <a:t>Enforcement mechanisms require </a:t>
+            </a:r>
+            <a:r>
+              <a:rPr lang="en-US" b="1" dirty="0" smtClean="0"/>
+              <a:t>soundness</a:t>
+            </a:r>
+            <a:r>
+              <a:rPr lang="en-US" dirty="0" smtClean="0"/>
+              <a:t> to guarantee security conditions.</a:t>
             </a:r>
           </a:p>
         </p:txBody>
       </p:sp>
       <p:grpSp>
         <p:nvGrpSpPr>
-          <p:cNvPr id="8" name="Group 7"/>
+          <p:cNvPr id="10" name="Group 9"/>
           <p:cNvGrpSpPr/>
           <p:nvPr/>
         </p:nvGrpSpPr>
         <p:grpSpPr>
           <a:xfrm>
-            <a:off x="381000" y="3200400"/>
-            <a:ext cx="8331200" cy="1844896"/>
-            <a:chOff x="381000" y="3200400"/>
-            <a:chExt cx="8331200" cy="1844896"/>
+            <a:off x="2438400" y="2743200"/>
+            <a:ext cx="3657600" cy="1320550"/>
+            <a:chOff x="5054600" y="3342668"/>
+            <a:chExt cx="3657600" cy="1320550"/>
           </a:xfrm>
         </p:grpSpPr>
         <p:pic>
@@ -12320,7 +12426,7 @@
         </p:pic>
         <p:pic>
           <p:nvPicPr>
-            <p:cNvPr id="34" name="Picture 33" descr="world.jpg"/>
+            <p:cNvPr id="37" name="Picture 36" descr="window.jpg"/>
             <p:cNvPicPr>
               <a:picLocks noChangeAspect="1"/>
             </p:cNvPicPr>
@@ -12328,96 +12434,6 @@
           </p:nvPicPr>
           <p:blipFill>
             <a:blip r:embed="rId5">
-              <a:extLst>
-                <a:ext uri="{28A0092B-C50C-407E-A947-70E740481C1C}">
-                  <a14:useLocalDpi xmlns:a14="http://schemas.microsoft.com/office/drawing/2010/main" val="0"/>
-                </a:ext>
-              </a:extLst>
-            </a:blip>
-            <a:stretch>
-              <a:fillRect/>
-            </a:stretch>
-          </p:blipFill>
-          <p:spPr>
-            <a:xfrm>
-              <a:off x="2362200" y="3213100"/>
-              <a:ext cx="1297875" cy="1551718"/>
-            </a:xfrm>
-            <a:prstGeom prst="rect">
-              <a:avLst/>
-            </a:prstGeom>
-          </p:spPr>
-        </p:pic>
-        <p:pic>
-          <p:nvPicPr>
-            <p:cNvPr id="35" name="Picture 34" descr="scientist.gif"/>
-            <p:cNvPicPr>
-              <a:picLocks noChangeAspect="1"/>
-            </p:cNvPicPr>
-            <p:nvPr/>
-          </p:nvPicPr>
-          <p:blipFill>
-            <a:blip r:embed="rId6">
-              <a:extLst>
-                <a:ext uri="{28A0092B-C50C-407E-A947-70E740481C1C}">
-                  <a14:useLocalDpi xmlns:a14="http://schemas.microsoft.com/office/drawing/2010/main" val="0"/>
-                </a:ext>
-              </a:extLst>
-            </a:blip>
-            <a:stretch>
-              <a:fillRect/>
-            </a:stretch>
-          </p:blipFill>
-          <p:spPr>
-            <a:xfrm>
-              <a:off x="381000" y="3200400"/>
-              <a:ext cx="860251" cy="1844896"/>
-            </a:xfrm>
-            <a:prstGeom prst="rect">
-              <a:avLst/>
-            </a:prstGeom>
-          </p:spPr>
-        </p:pic>
-        <p:pic>
-          <p:nvPicPr>
-            <p:cNvPr id="36" name="Picture 35" descr="window.jpg"/>
-            <p:cNvPicPr>
-              <a:picLocks noChangeAspect="1"/>
-            </p:cNvPicPr>
-            <p:nvPr/>
-          </p:nvPicPr>
-          <p:blipFill>
-            <a:blip r:embed="rId7">
-              <a:extLst>
-                <a:ext uri="{28A0092B-C50C-407E-A947-70E740481C1C}">
-                  <a14:useLocalDpi xmlns:a14="http://schemas.microsoft.com/office/drawing/2010/main" val="0"/>
-                </a:ext>
-              </a:extLst>
-            </a:blip>
-            <a:stretch>
-              <a:fillRect/>
-            </a:stretch>
-          </p:blipFill>
-          <p:spPr>
-            <a:xfrm>
-              <a:off x="1371600" y="3491341"/>
-              <a:ext cx="727854" cy="1143000"/>
-            </a:xfrm>
-            <a:prstGeom prst="rect">
-              <a:avLst/>
-            </a:prstGeom>
-          </p:spPr>
-        </p:pic>
-        <p:pic>
-          <p:nvPicPr>
-            <p:cNvPr id="37" name="Picture 36" descr="window.jpg"/>
-            <p:cNvPicPr>
-              <a:picLocks noChangeAspect="1"/>
-            </p:cNvPicPr>
-            <p:nvPr/>
-          </p:nvPicPr>
-          <p:blipFill>
-            <a:blip r:embed="rId7">
               <a:extLst>
                 <a:ext uri="{28A0092B-C50C-407E-A947-70E740481C1C}">
                   <a14:useLocalDpi xmlns:a14="http://schemas.microsoft.com/office/drawing/2010/main" val="0"/>
@@ -12438,47 +12454,6 @@
             </a:prstGeom>
           </p:spPr>
         </p:pic>
-        <p:sp>
-          <p:nvSpPr>
-            <p:cNvPr id="38" name="Left-Right Arrow 37"/>
-            <p:cNvSpPr/>
-            <p:nvPr/>
-          </p:nvSpPr>
-          <p:spPr>
-            <a:xfrm>
-              <a:off x="3962400" y="3719941"/>
-              <a:ext cx="838200" cy="457200"/>
-            </a:xfrm>
-            <a:prstGeom prst="leftRightArrow">
-              <a:avLst/>
-            </a:prstGeom>
-            <a:solidFill>
-              <a:srgbClr val="FFFFFF"/>
-            </a:solidFill>
-          </p:spPr>
-          <p:style>
-            <a:lnRef idx="1">
-              <a:schemeClr val="accent1"/>
-            </a:lnRef>
-            <a:fillRef idx="3">
-              <a:schemeClr val="accent1"/>
-            </a:fillRef>
-            <a:effectRef idx="2">
-              <a:schemeClr val="accent1"/>
-            </a:effectRef>
-            <a:fontRef idx="minor">
-              <a:schemeClr val="lt1"/>
-            </a:fontRef>
-          </p:style>
-          <p:txBody>
-            <a:bodyPr rtlCol="0" anchor="ctr"/>
-            <a:lstStyle/>
-            <a:p>
-              <a:pPr algn="ctr"/>
-              <a:endParaRPr lang="en-US"/>
-            </a:p>
-          </p:txBody>
-        </p:sp>
       </p:grpSp>
     </p:spTree>
     <p:extLst>
@@ -12519,6 +12494,1247 @@
       </p:grpSpPr>
       <p:sp>
         <p:nvSpPr>
+          <p:cNvPr id="4" name="Title 3"/>
+          <p:cNvSpPr>
+            <a:spLocks noGrp="1"/>
+          </p:cNvSpPr>
+          <p:nvPr>
+            <p:ph type="title"/>
+          </p:nvPr>
+        </p:nvSpPr>
+        <p:spPr/>
+        <p:txBody>
+          <a:bodyPr>
+            <a:normAutofit fontScale="90000"/>
+          </a:bodyPr>
+          <a:lstStyle/>
+          <a:p>
+            <a:r>
+              <a:rPr lang="en-US" dirty="0" smtClean="0"/>
+              <a:t>Probabilistic computation for information security</a:t>
+            </a:r>
+            <a:endParaRPr lang="en-US" dirty="0"/>
+          </a:p>
+        </p:txBody>
+      </p:sp>
+      <p:sp>
+        <p:nvSpPr>
+          <p:cNvPr id="6" name="TextBox 5"/>
+          <p:cNvSpPr txBox="1"/>
+          <p:nvPr/>
+        </p:nvSpPr>
+        <p:spPr>
+          <a:xfrm>
+            <a:off x="228600" y="1676400"/>
+            <a:ext cx="8686800" cy="923330"/>
+          </a:xfrm>
+          <a:prstGeom prst="rect">
+            <a:avLst/>
+          </a:prstGeom>
+          <a:noFill/>
+        </p:spPr>
+        <p:txBody>
+          <a:bodyPr wrap="square" rtlCol="0">
+            <a:spAutoFit/>
+          </a:bodyPr>
+          <a:lstStyle/>
+          <a:p>
+            <a:pPr marL="285750" indent="-285750">
+              <a:buFont typeface="Arial"/>
+              <a:buChar char="•"/>
+            </a:pPr>
+            <a:r>
+              <a:rPr lang="en-US" b="1" dirty="0" smtClean="0"/>
+              <a:t>Convenient</a:t>
+            </a:r>
+            <a:r>
+              <a:rPr lang="en-US" dirty="0" smtClean="0"/>
+              <a:t> reasoning about information security.</a:t>
+            </a:r>
+          </a:p>
+          <a:p>
+            <a:pPr marL="742950" lvl="1" indent="-285750">
+              <a:buFont typeface="Arial"/>
+              <a:buChar char="•"/>
+            </a:pPr>
+            <a:r>
+              <a:rPr lang="en-US" sz="1600" dirty="0" smtClean="0"/>
+              <a:t>“Semantic” information flow: more </a:t>
+            </a:r>
+            <a:r>
+              <a:rPr lang="en-US" sz="1600" b="1" dirty="0" smtClean="0"/>
+              <a:t>flexible</a:t>
+            </a:r>
+            <a:r>
+              <a:rPr lang="en-US" sz="1600" dirty="0" smtClean="0"/>
+              <a:t> than quantified information flow</a:t>
+            </a:r>
+          </a:p>
+          <a:p>
+            <a:pPr marL="285750" indent="-285750">
+              <a:buFont typeface="Arial"/>
+              <a:buChar char="•"/>
+            </a:pPr>
+            <a:r>
+              <a:rPr lang="en-US" dirty="0" smtClean="0"/>
+              <a:t>Enforcement mechanisms require </a:t>
+            </a:r>
+            <a:r>
+              <a:rPr lang="en-US" b="1" dirty="0" smtClean="0"/>
+              <a:t>soundness</a:t>
+            </a:r>
+            <a:r>
+              <a:rPr lang="en-US" dirty="0" smtClean="0"/>
+              <a:t> to guarantee security conditions.</a:t>
+            </a:r>
+          </a:p>
+        </p:txBody>
+      </p:sp>
+      <p:grpSp>
+        <p:nvGrpSpPr>
+          <p:cNvPr id="11" name="Group 10"/>
+          <p:cNvGrpSpPr/>
+          <p:nvPr/>
+        </p:nvGrpSpPr>
+        <p:grpSpPr>
+          <a:xfrm>
+            <a:off x="5486400" y="1524000"/>
+            <a:ext cx="3279075" cy="1844896"/>
+            <a:chOff x="381000" y="3200400"/>
+            <a:chExt cx="3279075" cy="1844896"/>
+          </a:xfrm>
+        </p:grpSpPr>
+        <p:pic>
+          <p:nvPicPr>
+            <p:cNvPr id="34" name="Picture 33" descr="world.jpg"/>
+            <p:cNvPicPr>
+              <a:picLocks noChangeAspect="1"/>
+            </p:cNvPicPr>
+            <p:nvPr/>
+          </p:nvPicPr>
+          <p:blipFill>
+            <a:blip r:embed="rId3">
+              <a:extLst>
+                <a:ext uri="{28A0092B-C50C-407E-A947-70E740481C1C}">
+                  <a14:useLocalDpi xmlns:a14="http://schemas.microsoft.com/office/drawing/2010/main" val="0"/>
+                </a:ext>
+              </a:extLst>
+            </a:blip>
+            <a:stretch>
+              <a:fillRect/>
+            </a:stretch>
+          </p:blipFill>
+          <p:spPr>
+            <a:xfrm>
+              <a:off x="2362200" y="3213100"/>
+              <a:ext cx="1297875" cy="1551718"/>
+            </a:xfrm>
+            <a:prstGeom prst="rect">
+              <a:avLst/>
+            </a:prstGeom>
+          </p:spPr>
+        </p:pic>
+        <p:pic>
+          <p:nvPicPr>
+            <p:cNvPr id="35" name="Picture 34" descr="scientist.gif"/>
+            <p:cNvPicPr>
+              <a:picLocks noChangeAspect="1"/>
+            </p:cNvPicPr>
+            <p:nvPr/>
+          </p:nvPicPr>
+          <p:blipFill>
+            <a:blip r:embed="rId4">
+              <a:extLst>
+                <a:ext uri="{28A0092B-C50C-407E-A947-70E740481C1C}">
+                  <a14:useLocalDpi xmlns:a14="http://schemas.microsoft.com/office/drawing/2010/main" val="0"/>
+                </a:ext>
+              </a:extLst>
+            </a:blip>
+            <a:stretch>
+              <a:fillRect/>
+            </a:stretch>
+          </p:blipFill>
+          <p:spPr>
+            <a:xfrm>
+              <a:off x="381000" y="3200400"/>
+              <a:ext cx="860251" cy="1844896"/>
+            </a:xfrm>
+            <a:prstGeom prst="rect">
+              <a:avLst/>
+            </a:prstGeom>
+          </p:spPr>
+        </p:pic>
+        <p:pic>
+          <p:nvPicPr>
+            <p:cNvPr id="36" name="Picture 35" descr="window.jpg"/>
+            <p:cNvPicPr>
+              <a:picLocks noChangeAspect="1"/>
+            </p:cNvPicPr>
+            <p:nvPr/>
+          </p:nvPicPr>
+          <p:blipFill>
+            <a:blip r:embed="rId5">
+              <a:extLst>
+                <a:ext uri="{28A0092B-C50C-407E-A947-70E740481C1C}">
+                  <a14:useLocalDpi xmlns:a14="http://schemas.microsoft.com/office/drawing/2010/main" val="0"/>
+                </a:ext>
+              </a:extLst>
+            </a:blip>
+            <a:stretch>
+              <a:fillRect/>
+            </a:stretch>
+          </p:blipFill>
+          <p:spPr>
+            <a:xfrm>
+              <a:off x="1371600" y="3491341"/>
+              <a:ext cx="727854" cy="1143000"/>
+            </a:xfrm>
+            <a:prstGeom prst="rect">
+              <a:avLst/>
+            </a:prstGeom>
+          </p:spPr>
+        </p:pic>
+      </p:grpSp>
+      <p:grpSp>
+        <p:nvGrpSpPr>
+          <p:cNvPr id="10" name="Group 9"/>
+          <p:cNvGrpSpPr/>
+          <p:nvPr/>
+        </p:nvGrpSpPr>
+        <p:grpSpPr>
+          <a:xfrm>
+            <a:off x="2438400" y="2743200"/>
+            <a:ext cx="3657600" cy="1320550"/>
+            <a:chOff x="5054600" y="3342668"/>
+            <a:chExt cx="3657600" cy="1320550"/>
+          </a:xfrm>
+        </p:grpSpPr>
+        <p:pic>
+          <p:nvPicPr>
+            <p:cNvPr id="32" name="Picture 31" descr="alice.jpg"/>
+            <p:cNvPicPr>
+              <a:picLocks noChangeAspect="1"/>
+            </p:cNvPicPr>
+            <p:nvPr/>
+          </p:nvPicPr>
+          <p:blipFill>
+            <a:blip r:embed="rId6">
+              <a:extLst>
+                <a:ext uri="{28A0092B-C50C-407E-A947-70E740481C1C}">
+                  <a14:useLocalDpi xmlns:a14="http://schemas.microsoft.com/office/drawing/2010/main" val="0"/>
+                </a:ext>
+              </a:extLst>
+            </a:blip>
+            <a:stretch>
+              <a:fillRect/>
+            </a:stretch>
+          </p:blipFill>
+          <p:spPr>
+            <a:xfrm>
+              <a:off x="7441241" y="3342668"/>
+              <a:ext cx="1270959" cy="1295400"/>
+            </a:xfrm>
+            <a:prstGeom prst="rect">
+              <a:avLst/>
+            </a:prstGeom>
+          </p:spPr>
+        </p:pic>
+        <p:pic>
+          <p:nvPicPr>
+            <p:cNvPr id="33" name="Content Placeholder 17" descr="hacker.jpeg"/>
+            <p:cNvPicPr>
+              <a:picLocks noChangeAspect="1"/>
+            </p:cNvPicPr>
+            <p:nvPr/>
+          </p:nvPicPr>
+          <p:blipFill rotWithShape="1">
+            <a:blip r:embed="rId7">
+              <a:extLst>
+                <a:ext uri="{28A0092B-C50C-407E-A947-70E740481C1C}">
+                  <a14:useLocalDpi xmlns:a14="http://schemas.microsoft.com/office/drawing/2010/main" val="0"/>
+                </a:ext>
+              </a:extLst>
+            </a:blip>
+            <a:srcRect t="-1767" b="-1767"/>
+            <a:stretch/>
+          </p:blipFill>
+          <p:spPr>
+            <a:xfrm>
+              <a:off x="5054600" y="3533168"/>
+              <a:ext cx="1371600" cy="944998"/>
+            </a:xfrm>
+            <a:prstGeom prst="rect">
+              <a:avLst/>
+            </a:prstGeom>
+          </p:spPr>
+        </p:pic>
+        <p:pic>
+          <p:nvPicPr>
+            <p:cNvPr id="37" name="Picture 36" descr="window.jpg"/>
+            <p:cNvPicPr>
+              <a:picLocks noChangeAspect="1"/>
+            </p:cNvPicPr>
+            <p:nvPr/>
+          </p:nvPicPr>
+          <p:blipFill>
+            <a:blip r:embed="rId5">
+              <a:extLst>
+                <a:ext uri="{28A0092B-C50C-407E-A947-70E740481C1C}">
+                  <a14:useLocalDpi xmlns:a14="http://schemas.microsoft.com/office/drawing/2010/main" val="0"/>
+                </a:ext>
+              </a:extLst>
+            </a:blip>
+            <a:stretch>
+              <a:fillRect/>
+            </a:stretch>
+          </p:blipFill>
+          <p:spPr>
+            <a:xfrm>
+              <a:off x="6536546" y="3444268"/>
+              <a:ext cx="776218" cy="1218950"/>
+            </a:xfrm>
+            <a:prstGeom prst="rect">
+              <a:avLst/>
+            </a:prstGeom>
+          </p:spPr>
+        </p:pic>
+      </p:grpSp>
+      <p:sp>
+        <p:nvSpPr>
+          <p:cNvPr id="38" name="Left-Right Arrow 37"/>
+          <p:cNvSpPr/>
+          <p:nvPr/>
+        </p:nvSpPr>
+        <p:spPr>
+          <a:xfrm>
+            <a:off x="4267200" y="2057400"/>
+            <a:ext cx="838200" cy="457200"/>
+          </a:xfrm>
+          <a:prstGeom prst="leftRightArrow">
+            <a:avLst/>
+          </a:prstGeom>
+          <a:solidFill>
+            <a:srgbClr val="FFFFFF"/>
+          </a:solidFill>
+        </p:spPr>
+        <p:style>
+          <a:lnRef idx="1">
+            <a:schemeClr val="accent1"/>
+          </a:lnRef>
+          <a:fillRef idx="3">
+            <a:schemeClr val="accent1"/>
+          </a:fillRef>
+          <a:effectRef idx="2">
+            <a:schemeClr val="accent1"/>
+          </a:effectRef>
+          <a:fontRef idx="minor">
+            <a:schemeClr val="lt1"/>
+          </a:fontRef>
+        </p:style>
+        <p:txBody>
+          <a:bodyPr rtlCol="0" anchor="ctr"/>
+          <a:lstStyle/>
+          <a:p>
+            <a:pPr algn="ctr"/>
+            <a:endParaRPr lang="en-US"/>
+          </a:p>
+        </p:txBody>
+      </p:sp>
+      <p:sp>
+        <p:nvSpPr>
+          <p:cNvPr id="9" name="TextBox 8"/>
+          <p:cNvSpPr txBox="1"/>
+          <p:nvPr/>
+        </p:nvSpPr>
+        <p:spPr>
+          <a:xfrm>
+            <a:off x="304801" y="3357027"/>
+            <a:ext cx="8458200" cy="1138773"/>
+          </a:xfrm>
+          <a:prstGeom prst="rect">
+            <a:avLst/>
+          </a:prstGeom>
+          <a:noFill/>
+        </p:spPr>
+        <p:txBody>
+          <a:bodyPr wrap="square" rtlCol="0">
+            <a:spAutoFit/>
+          </a:bodyPr>
+          <a:lstStyle/>
+          <a:p>
+            <a:pPr marL="285750" indent="-285750">
+              <a:buFont typeface="Arial"/>
+              <a:buChar char="•"/>
+            </a:pPr>
+            <a:r>
+              <a:rPr lang="en-US" dirty="0" smtClean="0"/>
+              <a:t>How to take advantage of ML-inspired probabilistic programming techniques for information security?</a:t>
+            </a:r>
+          </a:p>
+          <a:p>
+            <a:pPr marL="742950" lvl="1" indent="-285750">
+              <a:buFont typeface="Arial"/>
+              <a:buChar char="•"/>
+            </a:pPr>
+            <a:r>
+              <a:rPr lang="en-US" sz="1600" dirty="0" smtClean="0"/>
+              <a:t>More efficient inference?</a:t>
+            </a:r>
+          </a:p>
+          <a:p>
+            <a:pPr marL="742950" lvl="1" indent="-285750">
+              <a:buFont typeface="Arial"/>
+              <a:buChar char="•"/>
+            </a:pPr>
+            <a:r>
+              <a:rPr lang="en-US" sz="1600" dirty="0" smtClean="0"/>
+              <a:t>Search problems: find “optimal” noising/obfuscation parameters</a:t>
+            </a:r>
+          </a:p>
+        </p:txBody>
+      </p:sp>
+      <p:grpSp>
+        <p:nvGrpSpPr>
+          <p:cNvPr id="12" name="Group 11"/>
+          <p:cNvGrpSpPr/>
+          <p:nvPr/>
+        </p:nvGrpSpPr>
+        <p:grpSpPr>
+          <a:xfrm>
+            <a:off x="914400" y="4543166"/>
+            <a:ext cx="7391399" cy="2238634"/>
+            <a:chOff x="914400" y="4543166"/>
+            <a:chExt cx="7391399" cy="2238634"/>
+          </a:xfrm>
+        </p:grpSpPr>
+        <p:sp>
+          <p:nvSpPr>
+            <p:cNvPr id="14" name="Rounded Rectangle 13"/>
+            <p:cNvSpPr/>
+            <p:nvPr/>
+          </p:nvSpPr>
+          <p:spPr>
+            <a:xfrm>
+              <a:off x="914400" y="4543166"/>
+              <a:ext cx="7391399" cy="2238634"/>
+            </a:xfrm>
+            <a:prstGeom prst="roundRect">
+              <a:avLst/>
+            </a:prstGeom>
+            <a:solidFill>
+              <a:srgbClr val="008000">
+                <a:alpha val="49000"/>
+              </a:srgbClr>
+            </a:solidFill>
+            <a:effectLst/>
+          </p:spPr>
+          <p:style>
+            <a:lnRef idx="1">
+              <a:schemeClr val="accent1"/>
+            </a:lnRef>
+            <a:fillRef idx="3">
+              <a:schemeClr val="accent1"/>
+            </a:fillRef>
+            <a:effectRef idx="2">
+              <a:schemeClr val="accent1"/>
+            </a:effectRef>
+            <a:fontRef idx="minor">
+              <a:schemeClr val="lt1"/>
+            </a:fontRef>
+          </p:style>
+          <p:txBody>
+            <a:bodyPr rtlCol="0" anchor="ctr"/>
+            <a:lstStyle/>
+            <a:p>
+              <a:pPr algn="ctr"/>
+              <a:endParaRPr lang="en-US"/>
+            </a:p>
+          </p:txBody>
+        </p:sp>
+        <p:sp>
+          <p:nvSpPr>
+            <p:cNvPr id="15" name="Rounded Rectangle 14"/>
+            <p:cNvSpPr/>
+            <p:nvPr/>
+          </p:nvSpPr>
+          <p:spPr>
+            <a:xfrm>
+              <a:off x="3886199" y="4543166"/>
+              <a:ext cx="4419600" cy="2238633"/>
+            </a:xfrm>
+            <a:prstGeom prst="roundRect">
+              <a:avLst/>
+            </a:prstGeom>
+            <a:solidFill>
+              <a:srgbClr val="FF6600"/>
+            </a:solidFill>
+            <a:ln>
+              <a:solidFill>
+                <a:srgbClr val="FF0000"/>
+              </a:solidFill>
+            </a:ln>
+          </p:spPr>
+          <p:style>
+            <a:lnRef idx="1">
+              <a:schemeClr val="accent1"/>
+            </a:lnRef>
+            <a:fillRef idx="3">
+              <a:schemeClr val="accent1"/>
+            </a:fillRef>
+            <a:effectRef idx="2">
+              <a:schemeClr val="accent1"/>
+            </a:effectRef>
+            <a:fontRef idx="minor">
+              <a:schemeClr val="lt1"/>
+            </a:fontRef>
+          </p:style>
+          <p:txBody>
+            <a:bodyPr rtlCol="0" anchor="ctr"/>
+            <a:lstStyle/>
+            <a:p>
+              <a:pPr algn="ctr"/>
+              <a:endParaRPr lang="en-US"/>
+            </a:p>
+          </p:txBody>
+        </p:sp>
+        <p:sp>
+          <p:nvSpPr>
+            <p:cNvPr id="17" name="Freeform 16"/>
+            <p:cNvSpPr/>
+            <p:nvPr/>
+          </p:nvSpPr>
+          <p:spPr>
+            <a:xfrm>
+              <a:off x="1524000" y="4687332"/>
+              <a:ext cx="5486400" cy="1701800"/>
+            </a:xfrm>
+            <a:custGeom>
+              <a:avLst/>
+              <a:gdLst>
+                <a:gd name="connsiteX0" fmla="*/ 0 w 5486400"/>
+                <a:gd name="connsiteY0" fmla="*/ 1701800 h 1701800"/>
+                <a:gd name="connsiteX1" fmla="*/ 508000 w 5486400"/>
+                <a:gd name="connsiteY1" fmla="*/ 1028700 h 1701800"/>
+                <a:gd name="connsiteX2" fmla="*/ 1752600 w 5486400"/>
+                <a:gd name="connsiteY2" fmla="*/ 342900 h 1701800"/>
+                <a:gd name="connsiteX3" fmla="*/ 3657600 w 5486400"/>
+                <a:gd name="connsiteY3" fmla="*/ 774700 h 1701800"/>
+                <a:gd name="connsiteX4" fmla="*/ 5486400 w 5486400"/>
+                <a:gd name="connsiteY4" fmla="*/ 0 h 1701800"/>
+              </a:gdLst>
+              <a:ahLst/>
+              <a:cxnLst>
+                <a:cxn ang="0">
+                  <a:pos x="connsiteX0" y="connsiteY0"/>
+                </a:cxn>
+                <a:cxn ang="0">
+                  <a:pos x="connsiteX1" y="connsiteY1"/>
+                </a:cxn>
+                <a:cxn ang="0">
+                  <a:pos x="connsiteX2" y="connsiteY2"/>
+                </a:cxn>
+                <a:cxn ang="0">
+                  <a:pos x="connsiteX3" y="connsiteY3"/>
+                </a:cxn>
+                <a:cxn ang="0">
+                  <a:pos x="connsiteX4" y="connsiteY4"/>
+                </a:cxn>
+              </a:cxnLst>
+              <a:rect l="l" t="t" r="r" b="b"/>
+              <a:pathLst>
+                <a:path w="5486400" h="1701800">
+                  <a:moveTo>
+                    <a:pt x="0" y="1701800"/>
+                  </a:moveTo>
+                  <a:cubicBezTo>
+                    <a:pt x="107950" y="1478491"/>
+                    <a:pt x="215900" y="1255183"/>
+                    <a:pt x="508000" y="1028700"/>
+                  </a:cubicBezTo>
+                  <a:cubicBezTo>
+                    <a:pt x="800100" y="802217"/>
+                    <a:pt x="1227667" y="385233"/>
+                    <a:pt x="1752600" y="342900"/>
+                  </a:cubicBezTo>
+                  <a:cubicBezTo>
+                    <a:pt x="2277533" y="300567"/>
+                    <a:pt x="3035300" y="831850"/>
+                    <a:pt x="3657600" y="774700"/>
+                  </a:cubicBezTo>
+                  <a:cubicBezTo>
+                    <a:pt x="4279900" y="717550"/>
+                    <a:pt x="5486400" y="0"/>
+                    <a:pt x="5486400" y="0"/>
+                  </a:cubicBezTo>
+                </a:path>
+              </a:pathLst>
+            </a:custGeom>
+            <a:ln w="12700" cmpd="sng">
+              <a:solidFill>
+                <a:srgbClr val="292934"/>
+              </a:solidFill>
+              <a:prstDash val="solid"/>
+              <a:headEnd type="none"/>
+              <a:tailEnd type="triangle"/>
+            </a:ln>
+          </p:spPr>
+          <p:style>
+            <a:lnRef idx="2">
+              <a:schemeClr val="dk1"/>
+            </a:lnRef>
+            <a:fillRef idx="0">
+              <a:schemeClr val="dk1"/>
+            </a:fillRef>
+            <a:effectRef idx="1">
+              <a:schemeClr val="dk1"/>
+            </a:effectRef>
+            <a:fontRef idx="minor">
+              <a:schemeClr val="tx1"/>
+            </a:fontRef>
+          </p:style>
+          <p:txBody>
+            <a:bodyPr rtlCol="0" anchor="ctr"/>
+            <a:lstStyle/>
+            <a:p>
+              <a:pPr algn="ctr"/>
+              <a:endParaRPr lang="en-US"/>
+            </a:p>
+          </p:txBody>
+        </p:sp>
+        <p:sp>
+          <p:nvSpPr>
+            <p:cNvPr id="18" name="Rectangle 17"/>
+            <p:cNvSpPr/>
+            <p:nvPr/>
+          </p:nvSpPr>
+          <p:spPr>
+            <a:xfrm>
+              <a:off x="1371600" y="5931932"/>
+              <a:ext cx="1380005" cy="646331"/>
+            </a:xfrm>
+            <a:prstGeom prst="rect">
+              <a:avLst/>
+            </a:prstGeom>
+          </p:spPr>
+          <p:txBody>
+            <a:bodyPr wrap="none">
+              <a:spAutoFit/>
+            </a:bodyPr>
+            <a:lstStyle/>
+            <a:p>
+              <a:r>
+                <a:rPr lang="en-US" sz="3600" b="1" dirty="0" smtClean="0">
+                  <a:solidFill>
+                    <a:schemeClr val="tx2">
+                      <a:lumMod val="50000"/>
+                    </a:schemeClr>
+                  </a:solidFill>
+                </a:rPr>
+                <a:t>.</a:t>
+              </a:r>
+              <a:r>
+                <a:rPr lang="en-US" dirty="0" smtClean="0"/>
+                <a:t> B</a:t>
+              </a:r>
+              <a:r>
+                <a:rPr lang="en-US" baseline="-25000" dirty="0" smtClean="0"/>
+                <a:t>1</a:t>
+              </a:r>
+              <a:r>
+                <a:rPr lang="en-US" dirty="0"/>
+                <a:t>~secret</a:t>
+              </a:r>
+            </a:p>
+          </p:txBody>
+        </p:sp>
+        <p:sp>
+          <p:nvSpPr>
+            <p:cNvPr id="19" name="Rectangle 18"/>
+            <p:cNvSpPr/>
+            <p:nvPr/>
+          </p:nvSpPr>
+          <p:spPr>
+            <a:xfrm>
+              <a:off x="1865125" y="5214898"/>
+              <a:ext cx="1380005" cy="646331"/>
+            </a:xfrm>
+            <a:prstGeom prst="rect">
+              <a:avLst/>
+            </a:prstGeom>
+          </p:spPr>
+          <p:txBody>
+            <a:bodyPr wrap="none">
+              <a:spAutoFit/>
+            </a:bodyPr>
+            <a:lstStyle/>
+            <a:p>
+              <a:r>
+                <a:rPr lang="en-US" sz="3600" b="1" dirty="0" smtClean="0">
+                  <a:solidFill>
+                    <a:schemeClr val="tx2">
+                      <a:lumMod val="50000"/>
+                    </a:schemeClr>
+                  </a:solidFill>
+                </a:rPr>
+                <a:t>.</a:t>
+              </a:r>
+              <a:r>
+                <a:rPr lang="en-US" b="1" dirty="0" smtClean="0">
+                  <a:solidFill>
+                    <a:schemeClr val="tx2">
+                      <a:lumMod val="50000"/>
+                    </a:schemeClr>
+                  </a:solidFill>
+                </a:rPr>
+                <a:t> </a:t>
+              </a:r>
+              <a:r>
+                <a:rPr lang="en-US" dirty="0" smtClean="0"/>
+                <a:t>B</a:t>
+              </a:r>
+              <a:r>
+                <a:rPr lang="en-US" baseline="-25000" dirty="0" smtClean="0"/>
+                <a:t>2</a:t>
+              </a:r>
+              <a:r>
+                <a:rPr lang="en-US" dirty="0" smtClean="0"/>
+                <a:t>~</a:t>
+              </a:r>
+              <a:r>
+                <a:rPr lang="en-US" dirty="0"/>
+                <a:t>secret</a:t>
+              </a:r>
+            </a:p>
+          </p:txBody>
+        </p:sp>
+        <p:sp>
+          <p:nvSpPr>
+            <p:cNvPr id="20" name="Rectangle 19"/>
+            <p:cNvSpPr/>
+            <p:nvPr/>
+          </p:nvSpPr>
+          <p:spPr>
+            <a:xfrm>
+              <a:off x="3115794" y="4543167"/>
+              <a:ext cx="1380005" cy="646331"/>
+            </a:xfrm>
+            <a:prstGeom prst="rect">
+              <a:avLst/>
+            </a:prstGeom>
+          </p:spPr>
+          <p:txBody>
+            <a:bodyPr wrap="none">
+              <a:spAutoFit/>
+            </a:bodyPr>
+            <a:lstStyle/>
+            <a:p>
+              <a:r>
+                <a:rPr lang="en-US" sz="3600" b="1" dirty="0" smtClean="0">
+                  <a:solidFill>
+                    <a:schemeClr val="tx2">
+                      <a:lumMod val="50000"/>
+                    </a:schemeClr>
+                  </a:solidFill>
+                </a:rPr>
+                <a:t>.</a:t>
+              </a:r>
+              <a:r>
+                <a:rPr lang="en-US" b="1" dirty="0" smtClean="0">
+                  <a:solidFill>
+                    <a:schemeClr val="tx2">
+                      <a:lumMod val="50000"/>
+                    </a:schemeClr>
+                  </a:solidFill>
+                </a:rPr>
+                <a:t> </a:t>
+              </a:r>
+              <a:r>
+                <a:rPr lang="en-US" dirty="0" smtClean="0"/>
+                <a:t>B</a:t>
+              </a:r>
+              <a:r>
+                <a:rPr lang="en-US" baseline="-25000" dirty="0" smtClean="0"/>
+                <a:t>3</a:t>
+              </a:r>
+              <a:r>
+                <a:rPr lang="en-US" dirty="0" smtClean="0"/>
+                <a:t>~</a:t>
+              </a:r>
+              <a:r>
+                <a:rPr lang="en-US" dirty="0"/>
+                <a:t>secret</a:t>
+              </a:r>
+            </a:p>
+          </p:txBody>
+        </p:sp>
+        <p:sp>
+          <p:nvSpPr>
+            <p:cNvPr id="22" name="Rectangle 21"/>
+            <p:cNvSpPr/>
+            <p:nvPr/>
+          </p:nvSpPr>
+          <p:spPr>
+            <a:xfrm>
+              <a:off x="4419599" y="4903569"/>
+              <a:ext cx="1380005" cy="646331"/>
+            </a:xfrm>
+            <a:prstGeom prst="rect">
+              <a:avLst/>
+            </a:prstGeom>
+          </p:spPr>
+          <p:txBody>
+            <a:bodyPr wrap="none">
+              <a:spAutoFit/>
+            </a:bodyPr>
+            <a:lstStyle/>
+            <a:p>
+              <a:r>
+                <a:rPr lang="en-US" sz="3600" b="1" dirty="0" smtClean="0">
+                  <a:solidFill>
+                    <a:schemeClr val="tx2">
+                      <a:lumMod val="50000"/>
+                    </a:schemeClr>
+                  </a:solidFill>
+                </a:rPr>
+                <a:t>.</a:t>
+              </a:r>
+              <a:r>
+                <a:rPr lang="en-US" b="1" dirty="0" smtClean="0">
+                  <a:solidFill>
+                    <a:schemeClr val="tx2">
+                      <a:lumMod val="50000"/>
+                    </a:schemeClr>
+                  </a:solidFill>
+                </a:rPr>
+                <a:t> </a:t>
+              </a:r>
+              <a:r>
+                <a:rPr lang="en-US" dirty="0" smtClean="0"/>
+                <a:t>B</a:t>
+              </a:r>
+              <a:r>
+                <a:rPr lang="en-US" baseline="-25000" dirty="0" smtClean="0"/>
+                <a:t>4</a:t>
+              </a:r>
+              <a:r>
+                <a:rPr lang="en-US" dirty="0" smtClean="0"/>
+                <a:t>~</a:t>
+              </a:r>
+              <a:r>
+                <a:rPr lang="en-US" dirty="0"/>
+                <a:t>secret</a:t>
+              </a:r>
+            </a:p>
+          </p:txBody>
+        </p:sp>
+      </p:grpSp>
+      <p:cxnSp>
+        <p:nvCxnSpPr>
+          <p:cNvPr id="3" name="Straight Arrow Connector 2"/>
+          <p:cNvCxnSpPr/>
+          <p:nvPr/>
+        </p:nvCxnSpPr>
+        <p:spPr>
+          <a:xfrm flipH="1">
+            <a:off x="3505200" y="5410200"/>
+            <a:ext cx="1066801" cy="521732"/>
+          </a:xfrm>
+          <a:prstGeom prst="straightConnector1">
+            <a:avLst/>
+          </a:prstGeom>
+          <a:ln>
+            <a:solidFill>
+              <a:srgbClr val="292934"/>
+            </a:solidFill>
+            <a:tailEnd type="arrow"/>
+          </a:ln>
+        </p:spPr>
+        <p:style>
+          <a:lnRef idx="2">
+            <a:schemeClr val="accent1"/>
+          </a:lnRef>
+          <a:fillRef idx="0">
+            <a:schemeClr val="accent1"/>
+          </a:fillRef>
+          <a:effectRef idx="1">
+            <a:schemeClr val="accent1"/>
+          </a:effectRef>
+          <a:fontRef idx="minor">
+            <a:schemeClr val="tx1"/>
+          </a:fontRef>
+        </p:style>
+      </p:cxnSp>
+    </p:spTree>
+    <p:extLst>
+      <p:ext uri="{BB962C8B-B14F-4D97-AF65-F5344CB8AC3E}">
+        <p14:creationId xmlns:p14="http://schemas.microsoft.com/office/powerpoint/2010/main" val="2850616429"/>
+      </p:ext>
+    </p:extLst>
+  </p:cSld>
+  <p:clrMapOvr>
+    <a:masterClrMapping/>
+  </p:clrMapOvr>
+  <p:timing>
+    <p:tnLst>
+      <p:par>
+        <p:cTn xmlns:p14="http://schemas.microsoft.com/office/powerpoint/2010/main" id="1" dur="indefinite" restart="never" nodeType="tmRoot">
+          <p:childTnLst>
+            <p:seq concurrent="1" nextAc="seek">
+              <p:cTn id="2" dur="indefinite" nodeType="mainSeq">
+                <p:childTnLst>
+                  <p:par>
+                    <p:cTn id="3" fill="hold">
+                      <p:stCondLst>
+                        <p:cond delay="indefinite"/>
+                      </p:stCondLst>
+                      <p:childTnLst>
+                        <p:par>
+                          <p:cTn id="4" fill="hold">
+                            <p:stCondLst>
+                              <p:cond delay="0"/>
+                            </p:stCondLst>
+                            <p:childTnLst>
+                              <p:par>
+                                <p:cTn id="5" presetID="10" presetClass="exit" presetSubtype="0" fill="hold" grpId="0" nodeType="clickEffect">
+                                  <p:stCondLst>
+                                    <p:cond delay="0"/>
+                                  </p:stCondLst>
+                                  <p:childTnLst>
+                                    <p:animEffect transition="out" filter="fade">
+                                      <p:cBhvr>
+                                        <p:cTn id="6" dur="500"/>
+                                        <p:tgtEl>
+                                          <p:spTgt spid="6"/>
+                                        </p:tgtEl>
+                                      </p:cBhvr>
+                                    </p:animEffect>
+                                    <p:set>
+                                      <p:cBhvr>
+                                        <p:cTn id="7" dur="1" fill="hold">
+                                          <p:stCondLst>
+                                            <p:cond delay="499"/>
+                                          </p:stCondLst>
+                                        </p:cTn>
+                                        <p:tgtEl>
+                                          <p:spTgt spid="6"/>
+                                        </p:tgtEl>
+                                        <p:attrNameLst>
+                                          <p:attrName>style.visibility</p:attrName>
+                                        </p:attrNameLst>
+                                      </p:cBhvr>
+                                      <p:to>
+                                        <p:strVal val="hidden"/>
+                                      </p:to>
+                                    </p:set>
+                                  </p:childTnLst>
+                                </p:cTn>
+                              </p:par>
+                              <p:par>
+                                <p:cTn id="8" presetID="0" presetClass="path" presetSubtype="0" accel="50000" decel="50000" fill="hold" nodeType="withEffect">
+                                  <p:stCondLst>
+                                    <p:cond delay="0"/>
+                                  </p:stCondLst>
+                                  <p:childTnLst>
+                                    <p:animMotion origin="layout" path="M 3.33333E-6 3.7037E-6 L -0.21667 -0.16297 " pathEditMode="relative" rAng="0" ptsTypes="AA">
+                                      <p:cBhvr>
+                                        <p:cTn id="9" dur="2000" fill="hold"/>
+                                        <p:tgtEl>
+                                          <p:spTgt spid="10"/>
+                                        </p:tgtEl>
+                                        <p:attrNameLst>
+                                          <p:attrName>ppt_x</p:attrName>
+                                          <p:attrName>ppt_y</p:attrName>
+                                        </p:attrNameLst>
+                                      </p:cBhvr>
+                                      <p:rCtr x="-10833" y="-8148"/>
+                                    </p:animMotion>
+                                  </p:childTnLst>
+                                </p:cTn>
+                              </p:par>
+                              <p:par>
+                                <p:cTn id="10" presetID="10" presetClass="entr" presetSubtype="0" fill="hold" nodeType="withEffect">
+                                  <p:stCondLst>
+                                    <p:cond delay="1000"/>
+                                  </p:stCondLst>
+                                  <p:childTnLst>
+                                    <p:set>
+                                      <p:cBhvr>
+                                        <p:cTn id="11" dur="1" fill="hold">
+                                          <p:stCondLst>
+                                            <p:cond delay="0"/>
+                                          </p:stCondLst>
+                                        </p:cTn>
+                                        <p:tgtEl>
+                                          <p:spTgt spid="11"/>
+                                        </p:tgtEl>
+                                        <p:attrNameLst>
+                                          <p:attrName>style.visibility</p:attrName>
+                                        </p:attrNameLst>
+                                      </p:cBhvr>
+                                      <p:to>
+                                        <p:strVal val="visible"/>
+                                      </p:to>
+                                    </p:set>
+                                    <p:animEffect transition="in" filter="fade">
+                                      <p:cBhvr>
+                                        <p:cTn id="12" dur="500"/>
+                                        <p:tgtEl>
+                                          <p:spTgt spid="11"/>
+                                        </p:tgtEl>
+                                      </p:cBhvr>
+                                    </p:animEffect>
+                                  </p:childTnLst>
+                                </p:cTn>
+                              </p:par>
+                              <p:par>
+                                <p:cTn id="13" presetID="10" presetClass="entr" presetSubtype="0" fill="hold" grpId="0" nodeType="withEffect">
+                                  <p:stCondLst>
+                                    <p:cond delay="1000"/>
+                                  </p:stCondLst>
+                                  <p:childTnLst>
+                                    <p:set>
+                                      <p:cBhvr>
+                                        <p:cTn id="14" dur="1" fill="hold">
+                                          <p:stCondLst>
+                                            <p:cond delay="0"/>
+                                          </p:stCondLst>
+                                        </p:cTn>
+                                        <p:tgtEl>
+                                          <p:spTgt spid="38"/>
+                                        </p:tgtEl>
+                                        <p:attrNameLst>
+                                          <p:attrName>style.visibility</p:attrName>
+                                        </p:attrNameLst>
+                                      </p:cBhvr>
+                                      <p:to>
+                                        <p:strVal val="visible"/>
+                                      </p:to>
+                                    </p:set>
+                                    <p:animEffect transition="in" filter="fade">
+                                      <p:cBhvr>
+                                        <p:cTn id="15" dur="500"/>
+                                        <p:tgtEl>
+                                          <p:spTgt spid="38"/>
+                                        </p:tgtEl>
+                                      </p:cBhvr>
+                                    </p:animEffect>
+                                  </p:childTnLst>
+                                </p:cTn>
+                              </p:par>
+                            </p:childTnLst>
+                          </p:cTn>
+                        </p:par>
+                      </p:childTnLst>
+                    </p:cTn>
+                  </p:par>
+                  <p:par>
+                    <p:cTn id="16" fill="hold">
+                      <p:stCondLst>
+                        <p:cond delay="indefinite"/>
+                      </p:stCondLst>
+                      <p:childTnLst>
+                        <p:par>
+                          <p:cTn id="17" fill="hold">
+                            <p:stCondLst>
+                              <p:cond delay="0"/>
+                            </p:stCondLst>
+                            <p:childTnLst>
+                              <p:par>
+                                <p:cTn id="18" presetID="10" presetClass="entr" presetSubtype="0" fill="hold" grpId="0" nodeType="clickEffect">
+                                  <p:stCondLst>
+                                    <p:cond delay="0"/>
+                                  </p:stCondLst>
+                                  <p:childTnLst>
+                                    <p:set>
+                                      <p:cBhvr>
+                                        <p:cTn id="19" dur="1" fill="hold">
+                                          <p:stCondLst>
+                                            <p:cond delay="0"/>
+                                          </p:stCondLst>
+                                        </p:cTn>
+                                        <p:tgtEl>
+                                          <p:spTgt spid="9"/>
+                                        </p:tgtEl>
+                                        <p:attrNameLst>
+                                          <p:attrName>style.visibility</p:attrName>
+                                        </p:attrNameLst>
+                                      </p:cBhvr>
+                                      <p:to>
+                                        <p:strVal val="visible"/>
+                                      </p:to>
+                                    </p:set>
+                                    <p:animEffect transition="in" filter="fade">
+                                      <p:cBhvr>
+                                        <p:cTn id="20" dur="500"/>
+                                        <p:tgtEl>
+                                          <p:spTgt spid="9"/>
+                                        </p:tgtEl>
+                                      </p:cBhvr>
+                                    </p:animEffect>
+                                  </p:childTnLst>
+                                </p:cTn>
+                              </p:par>
+                            </p:childTnLst>
+                          </p:cTn>
+                        </p:par>
+                      </p:childTnLst>
+                    </p:cTn>
+                  </p:par>
+                  <p:par>
+                    <p:cTn id="21" fill="hold">
+                      <p:stCondLst>
+                        <p:cond delay="indefinite"/>
+                      </p:stCondLst>
+                      <p:childTnLst>
+                        <p:par>
+                          <p:cTn id="22" fill="hold">
+                            <p:stCondLst>
+                              <p:cond delay="0"/>
+                            </p:stCondLst>
+                            <p:childTnLst>
+                              <p:par>
+                                <p:cTn id="23" presetID="10" presetClass="entr" presetSubtype="0" fill="hold" nodeType="clickEffect">
+                                  <p:stCondLst>
+                                    <p:cond delay="0"/>
+                                  </p:stCondLst>
+                                  <p:childTnLst>
+                                    <p:set>
+                                      <p:cBhvr>
+                                        <p:cTn id="24" dur="1" fill="hold">
+                                          <p:stCondLst>
+                                            <p:cond delay="0"/>
+                                          </p:stCondLst>
+                                        </p:cTn>
+                                        <p:tgtEl>
+                                          <p:spTgt spid="12"/>
+                                        </p:tgtEl>
+                                        <p:attrNameLst>
+                                          <p:attrName>style.visibility</p:attrName>
+                                        </p:attrNameLst>
+                                      </p:cBhvr>
+                                      <p:to>
+                                        <p:strVal val="visible"/>
+                                      </p:to>
+                                    </p:set>
+                                    <p:animEffect transition="in" filter="fade">
+                                      <p:cBhvr>
+                                        <p:cTn id="25" dur="500"/>
+                                        <p:tgtEl>
+                                          <p:spTgt spid="12"/>
+                                        </p:tgtEl>
+                                      </p:cBhvr>
+                                    </p:animEffect>
+                                  </p:childTnLst>
+                                </p:cTn>
+                              </p:par>
+                            </p:childTnLst>
+                          </p:cTn>
+                        </p:par>
+                      </p:childTnLst>
+                    </p:cTn>
+                  </p:par>
+                  <p:par>
+                    <p:cTn id="26" fill="hold">
+                      <p:stCondLst>
+                        <p:cond delay="indefinite"/>
+                      </p:stCondLst>
+                      <p:childTnLst>
+                        <p:par>
+                          <p:cTn id="27" fill="hold">
+                            <p:stCondLst>
+                              <p:cond delay="0"/>
+                            </p:stCondLst>
+                            <p:childTnLst>
+                              <p:par>
+                                <p:cTn id="28" presetID="10" presetClass="entr" presetSubtype="0" fill="hold" nodeType="clickEffect">
+                                  <p:stCondLst>
+                                    <p:cond delay="0"/>
+                                  </p:stCondLst>
+                                  <p:childTnLst>
+                                    <p:set>
+                                      <p:cBhvr>
+                                        <p:cTn id="29" dur="1" fill="hold">
+                                          <p:stCondLst>
+                                            <p:cond delay="0"/>
+                                          </p:stCondLst>
+                                        </p:cTn>
+                                        <p:tgtEl>
+                                          <p:spTgt spid="3"/>
+                                        </p:tgtEl>
+                                        <p:attrNameLst>
+                                          <p:attrName>style.visibility</p:attrName>
+                                        </p:attrNameLst>
+                                      </p:cBhvr>
+                                      <p:to>
+                                        <p:strVal val="visible"/>
+                                      </p:to>
+                                    </p:set>
+                                    <p:animEffect transition="in" filter="fade">
+                                      <p:cBhvr>
+                                        <p:cTn id="30" dur="500"/>
+                                        <p:tgtEl>
+                                          <p:spTgt spid="3"/>
+                                        </p:tgtEl>
+                                      </p:cBhvr>
+                                    </p:animEffect>
+                                  </p:childTnLst>
+                                </p:cTn>
+                              </p:par>
+                            </p:childTnLst>
+                          </p:cTn>
+                        </p:par>
+                      </p:childTnLst>
+                    </p:cTn>
+                  </p:par>
+                </p:childTnLst>
+              </p:cTn>
+              <p:prevCondLst>
+                <p:cond evt="onPrev" delay="0">
+                  <p:tgtEl>
+                    <p:sldTgt/>
+                  </p:tgtEl>
+                </p:cond>
+              </p:prevCondLst>
+              <p:nextCondLst>
+                <p:cond evt="onNext" delay="0">
+                  <p:tgtEl>
+                    <p:sldTgt/>
+                  </p:tgtEl>
+                </p:cond>
+              </p:nextCondLst>
+            </p:seq>
+          </p:childTnLst>
+        </p:cTn>
+      </p:par>
+    </p:tnLst>
+    <p:bldLst>
+      <p:bldP spid="6" grpId="0"/>
+      <p:bldP spid="38" grpId="0" animBg="1"/>
+      <p:bldP spid="9" grpId="0"/>
+    </p:bldLst>
+  </p:timing>
+</p:sld>
+</file>
+
+<file path=ppt/slides/slide17.xml><?xml version="1.0" encoding="utf-8"?>
+<p:sld xmlns:a="http://schemas.openxmlformats.org/drawingml/2006/main" xmlns:r="http://schemas.openxmlformats.org/officeDocument/2006/relationships" xmlns:p="http://schemas.openxmlformats.org/presentationml/2006/main">
+  <p:cSld>
+    <p:spTree>
+      <p:nvGrpSpPr>
+        <p:cNvPr id="1" name=""/>
+        <p:cNvGrpSpPr/>
+        <p:nvPr/>
+      </p:nvGrpSpPr>
+      <p:grpSpPr>
+        <a:xfrm>
+          <a:off x="0" y="0"/>
+          <a:ext cx="0" cy="0"/>
+          <a:chOff x="0" y="0"/>
+          <a:chExt cx="0" cy="0"/>
+        </a:xfrm>
+      </p:grpSpPr>
+      <p:sp>
+        <p:nvSpPr>
           <p:cNvPr id="2" name="Title 1"/>
           <p:cNvSpPr>
             <a:spLocks noGrp="1"/>
@@ -12577,7 +13793,7 @@
             <a:fld id="{1D72EBF8-7CF5-44B7-B2BF-E22DE4D0703D}" type="slidenum">
               <a:rPr lang="en-US" smtClean="0"/>
               <a:pPr/>
-              <a:t>16</a:t>
+              <a:t>17</a:t>
             </a:fld>
             <a:endParaRPr lang="en-US"/>
           </a:p>

</xml_diff>